<commit_message>
:bug: Map iteration is not O(1)
Problem:
- Map iteration is said to be O(1).

Solution:
- Update it to O(n).
</commit_message>
<xml_diff>
--- a/map_trap.pptx
+++ b/map_trap.pptx
@@ -330,11 +330,11 @@
         </c:dLbls>
         <c:marker val="1"/>
         <c:smooth val="0"/>
-        <c:axId val="2134778360"/>
-        <c:axId val="2130937592"/>
+        <c:axId val="2112386680"/>
+        <c:axId val="2112389704"/>
       </c:lineChart>
       <c:catAx>
-        <c:axId val="2134778360"/>
+        <c:axId val="2112386680"/>
         <c:scaling>
           <c:orientation val="minMax"/>
         </c:scaling>
@@ -344,7 +344,7 @@
         <c:majorTickMark val="out"/>
         <c:minorTickMark val="none"/>
         <c:tickLblPos val="nextTo"/>
-        <c:crossAx val="2130937592"/>
+        <c:crossAx val="2112389704"/>
         <c:crosses val="autoZero"/>
         <c:auto val="1"/>
         <c:lblAlgn val="ctr"/>
@@ -352,7 +352,7 @@
         <c:noMultiLvlLbl val="0"/>
       </c:catAx>
       <c:valAx>
-        <c:axId val="2130937592"/>
+        <c:axId val="2112389704"/>
         <c:scaling>
           <c:orientation val="minMax"/>
         </c:scaling>
@@ -363,7 +363,7 @@
         <c:majorTickMark val="out"/>
         <c:minorTickMark val="none"/>
         <c:tickLblPos val="nextTo"/>
-        <c:crossAx val="2134778360"/>
+        <c:crossAx val="2112386680"/>
         <c:crosses val="autoZero"/>
         <c:crossBetween val="between"/>
       </c:valAx>
@@ -532,7 +532,7 @@
                   <c:v>412.645</c:v>
                 </c:pt>
                 <c:pt idx="7">
-                  <c:v>823.1609999999998</c:v>
+                  <c:v>823.1609999999997</c:v>
                 </c:pt>
                 <c:pt idx="8">
                   <c:v>1858.84</c:v>
@@ -573,11 +573,11 @@
         </c:dLbls>
         <c:marker val="1"/>
         <c:smooth val="0"/>
-        <c:axId val="2131044888"/>
-        <c:axId val="2131047896"/>
+        <c:axId val="2113319672"/>
+        <c:axId val="2113322696"/>
       </c:lineChart>
       <c:catAx>
-        <c:axId val="2131044888"/>
+        <c:axId val="2113319672"/>
         <c:scaling>
           <c:orientation val="minMax"/>
         </c:scaling>
@@ -587,7 +587,7 @@
         <c:majorTickMark val="out"/>
         <c:minorTickMark val="none"/>
         <c:tickLblPos val="nextTo"/>
-        <c:crossAx val="2131047896"/>
+        <c:crossAx val="2113322696"/>
         <c:crosses val="autoZero"/>
         <c:auto val="1"/>
         <c:lblAlgn val="ctr"/>
@@ -595,7 +595,7 @@
         <c:noMultiLvlLbl val="0"/>
       </c:catAx>
       <c:valAx>
-        <c:axId val="2131047896"/>
+        <c:axId val="2113322696"/>
         <c:scaling>
           <c:logBase val="10.0"/>
           <c:orientation val="minMax"/>
@@ -607,7 +607,7 @@
         <c:majorTickMark val="out"/>
         <c:minorTickMark val="none"/>
         <c:tickLblPos val="nextTo"/>
-        <c:crossAx val="2131044888"/>
+        <c:crossAx val="2113319672"/>
         <c:crosses val="autoZero"/>
         <c:crossBetween val="between"/>
       </c:valAx>
@@ -776,7 +776,7 @@
                   <c:v>412.645</c:v>
                 </c:pt>
                 <c:pt idx="7">
-                  <c:v>823.1609999999998</c:v>
+                  <c:v>823.1609999999997</c:v>
                 </c:pt>
                 <c:pt idx="8">
                   <c:v>1858.84</c:v>
@@ -950,11 +950,11 @@
         </c:dLbls>
         <c:marker val="1"/>
         <c:smooth val="0"/>
-        <c:axId val="2131098136"/>
-        <c:axId val="2131101176"/>
+        <c:axId val="2113372952"/>
+        <c:axId val="2113375992"/>
       </c:lineChart>
       <c:catAx>
-        <c:axId val="2131098136"/>
+        <c:axId val="2113372952"/>
         <c:scaling>
           <c:orientation val="minMax"/>
         </c:scaling>
@@ -964,7 +964,7 @@
         <c:majorTickMark val="out"/>
         <c:minorTickMark val="none"/>
         <c:tickLblPos val="nextTo"/>
-        <c:crossAx val="2131101176"/>
+        <c:crossAx val="2113375992"/>
         <c:crosses val="autoZero"/>
         <c:auto val="1"/>
         <c:lblAlgn val="ctr"/>
@@ -972,7 +972,7 @@
         <c:noMultiLvlLbl val="0"/>
       </c:catAx>
       <c:valAx>
-        <c:axId val="2131101176"/>
+        <c:axId val="2113375992"/>
         <c:scaling>
           <c:logBase val="10.0"/>
           <c:orientation val="minMax"/>
@@ -984,7 +984,7 @@
         <c:majorTickMark val="out"/>
         <c:minorTickMark val="none"/>
         <c:tickLblPos val="nextTo"/>
-        <c:crossAx val="2131098136"/>
+        <c:crossAx val="2113372952"/>
         <c:crosses val="autoZero"/>
         <c:crossBetween val="between"/>
       </c:valAx>
@@ -1153,7 +1153,7 @@
                   <c:v>412.645</c:v>
                 </c:pt>
                 <c:pt idx="7">
-                  <c:v>823.1609999999998</c:v>
+                  <c:v>823.1609999999997</c:v>
                 </c:pt>
                 <c:pt idx="8">
                   <c:v>1858.84</c:v>
@@ -1460,11 +1460,11 @@
         </c:dLbls>
         <c:marker val="1"/>
         <c:smooth val="0"/>
-        <c:axId val="2137748248"/>
-        <c:axId val="2137751288"/>
+        <c:axId val="2111665016"/>
+        <c:axId val="2111668056"/>
       </c:lineChart>
       <c:catAx>
-        <c:axId val="2137748248"/>
+        <c:axId val="2111665016"/>
         <c:scaling>
           <c:orientation val="minMax"/>
         </c:scaling>
@@ -1474,7 +1474,7 @@
         <c:majorTickMark val="out"/>
         <c:minorTickMark val="none"/>
         <c:tickLblPos val="nextTo"/>
-        <c:crossAx val="2137751288"/>
+        <c:crossAx val="2111668056"/>
         <c:crosses val="autoZero"/>
         <c:auto val="1"/>
         <c:lblAlgn val="ctr"/>
@@ -1482,7 +1482,7 @@
         <c:noMultiLvlLbl val="0"/>
       </c:catAx>
       <c:valAx>
-        <c:axId val="2137751288"/>
+        <c:axId val="2111668056"/>
         <c:scaling>
           <c:logBase val="10.0"/>
           <c:orientation val="minMax"/>
@@ -1494,7 +1494,7 @@
         <c:majorTickMark val="out"/>
         <c:minorTickMark val="none"/>
         <c:tickLblPos val="nextTo"/>
-        <c:crossAx val="2137748248"/>
+        <c:crossAx val="2111665016"/>
         <c:crosses val="autoZero"/>
         <c:crossBetween val="between"/>
       </c:valAx>
@@ -1663,7 +1663,7 @@
                   <c:v>412.645</c:v>
                 </c:pt>
                 <c:pt idx="7">
-                  <c:v>823.1609999999998</c:v>
+                  <c:v>823.1609999999997</c:v>
                 </c:pt>
                 <c:pt idx="8">
                   <c:v>1858.84</c:v>
@@ -2103,11 +2103,11 @@
         </c:dLbls>
         <c:marker val="1"/>
         <c:smooth val="0"/>
-        <c:axId val="2137808296"/>
-        <c:axId val="2137811416"/>
+        <c:axId val="2110092056"/>
+        <c:axId val="2110095176"/>
       </c:lineChart>
       <c:catAx>
-        <c:axId val="2137808296"/>
+        <c:axId val="2110092056"/>
         <c:scaling>
           <c:orientation val="minMax"/>
         </c:scaling>
@@ -2117,7 +2117,7 @@
         <c:majorTickMark val="out"/>
         <c:minorTickMark val="none"/>
         <c:tickLblPos val="nextTo"/>
-        <c:crossAx val="2137811416"/>
+        <c:crossAx val="2110095176"/>
         <c:crosses val="autoZero"/>
         <c:auto val="1"/>
         <c:lblAlgn val="ctr"/>
@@ -2125,7 +2125,7 @@
         <c:noMultiLvlLbl val="0"/>
       </c:catAx>
       <c:valAx>
-        <c:axId val="2137811416"/>
+        <c:axId val="2110095176"/>
         <c:scaling>
           <c:logBase val="10.0"/>
           <c:orientation val="minMax"/>
@@ -2137,7 +2137,7 @@
         <c:majorTickMark val="out"/>
         <c:minorTickMark val="none"/>
         <c:tickLblPos val="nextTo"/>
-        <c:crossAx val="2137808296"/>
+        <c:crossAx val="2110092056"/>
         <c:crosses val="autoZero"/>
         <c:crossBetween val="between"/>
       </c:valAx>
@@ -2191,6 +2191,7 @@
           </a:p>
         </c:rich>
       </c:tx>
+      <c:layout/>
       <c:overlay val="0"/>
     </c:title>
     <c:autoTitleDeleted val="0"/>
@@ -2289,10 +2290,10 @@
                   <c:v>534.0170000000001</c:v>
                 </c:pt>
                 <c:pt idx="8">
-                  <c:v>527.9269999999999</c:v>
+                  <c:v>527.9269999999998</c:v>
                 </c:pt>
                 <c:pt idx="9">
-                  <c:v>521.0509999999999</c:v>
+                  <c:v>521.0509999999998</c:v>
                 </c:pt>
                 <c:pt idx="10">
                   <c:v>510.19</c:v>
@@ -2312,11 +2313,11 @@
         </c:dLbls>
         <c:marker val="1"/>
         <c:smooth val="0"/>
-        <c:axId val="2137498568"/>
-        <c:axId val="2137488440"/>
+        <c:axId val="2105953704"/>
+        <c:axId val="2143144872"/>
       </c:lineChart>
       <c:catAx>
-        <c:axId val="2137498568"/>
+        <c:axId val="2105953704"/>
         <c:scaling>
           <c:orientation val="minMax"/>
         </c:scaling>
@@ -2326,7 +2327,7 @@
         <c:majorTickMark val="out"/>
         <c:minorTickMark val="none"/>
         <c:tickLblPos val="nextTo"/>
-        <c:crossAx val="2137488440"/>
+        <c:crossAx val="2143144872"/>
         <c:crosses val="autoZero"/>
         <c:auto val="1"/>
         <c:lblAlgn val="ctr"/>
@@ -2334,7 +2335,7 @@
         <c:noMultiLvlLbl val="0"/>
       </c:catAx>
       <c:valAx>
-        <c:axId val="2137488440"/>
+        <c:axId val="2143144872"/>
         <c:scaling>
           <c:orientation val="minMax"/>
         </c:scaling>
@@ -2345,13 +2346,14 @@
         <c:majorTickMark val="out"/>
         <c:minorTickMark val="none"/>
         <c:tickLblPos val="nextTo"/>
-        <c:crossAx val="2137498568"/>
+        <c:crossAx val="2105953704"/>
         <c:crosses val="autoZero"/>
         <c:crossBetween val="between"/>
       </c:valAx>
     </c:plotArea>
     <c:legend>
       <c:legendPos val="r"/>
+      <c:layout/>
       <c:overlay val="0"/>
     </c:legend>
     <c:plotVisOnly val="1"/>
@@ -2398,6 +2400,7 @@
           </a:p>
         </c:rich>
       </c:tx>
+      <c:layout/>
       <c:overlay val="0"/>
     </c:title>
     <c:autoTitleDeleted val="0"/>
@@ -2496,10 +2499,10 @@
                   <c:v>534.0170000000001</c:v>
                 </c:pt>
                 <c:pt idx="8">
-                  <c:v>527.9269999999999</c:v>
+                  <c:v>527.9269999999998</c:v>
                 </c:pt>
                 <c:pt idx="9">
-                  <c:v>521.0509999999999</c:v>
+                  <c:v>521.0509999999998</c:v>
                 </c:pt>
                 <c:pt idx="10">
                   <c:v>510.19</c:v>
@@ -2596,7 +2599,7 @@
                   <c:v>791.675</c:v>
                 </c:pt>
                 <c:pt idx="7">
-                  <c:v>783.5309999999998</c:v>
+                  <c:v>783.5309999999997</c:v>
                 </c:pt>
                 <c:pt idx="8">
                   <c:v>776.996</c:v>
@@ -2622,11 +2625,11 @@
         </c:dLbls>
         <c:marker val="1"/>
         <c:smooth val="0"/>
-        <c:axId val="2138708536"/>
-        <c:axId val="2138711512"/>
+        <c:axId val="2139227944"/>
+        <c:axId val="2139224952"/>
       </c:lineChart>
       <c:catAx>
-        <c:axId val="2138708536"/>
+        <c:axId val="2139227944"/>
         <c:scaling>
           <c:orientation val="minMax"/>
         </c:scaling>
@@ -2636,7 +2639,7 @@
         <c:majorTickMark val="out"/>
         <c:minorTickMark val="none"/>
         <c:tickLblPos val="nextTo"/>
-        <c:crossAx val="2138711512"/>
+        <c:crossAx val="2139224952"/>
         <c:crosses val="autoZero"/>
         <c:auto val="1"/>
         <c:lblAlgn val="ctr"/>
@@ -2644,7 +2647,7 @@
         <c:noMultiLvlLbl val="0"/>
       </c:catAx>
       <c:valAx>
-        <c:axId val="2138711512"/>
+        <c:axId val="2139224952"/>
         <c:scaling>
           <c:orientation val="minMax"/>
         </c:scaling>
@@ -2655,13 +2658,14 @@
         <c:majorTickMark val="out"/>
         <c:minorTickMark val="none"/>
         <c:tickLblPos val="nextTo"/>
-        <c:crossAx val="2138708536"/>
+        <c:crossAx val="2139227944"/>
         <c:crosses val="autoZero"/>
         <c:crossBetween val="between"/>
       </c:valAx>
     </c:plotArea>
     <c:legend>
       <c:legendPos val="r"/>
+      <c:layout/>
       <c:overlay val="0"/>
     </c:legend>
     <c:plotVisOnly val="1"/>
@@ -2708,6 +2712,7 @@
           </a:p>
         </c:rich>
       </c:tx>
+      <c:layout/>
       <c:overlay val="0"/>
     </c:title>
     <c:autoTitleDeleted val="0"/>
@@ -2806,10 +2811,10 @@
                   <c:v>534.0170000000001</c:v>
                 </c:pt>
                 <c:pt idx="8">
-                  <c:v>527.9269999999999</c:v>
+                  <c:v>527.9269999999998</c:v>
                 </c:pt>
                 <c:pt idx="9">
-                  <c:v>521.0509999999999</c:v>
+                  <c:v>521.0509999999998</c:v>
                 </c:pt>
                 <c:pt idx="10">
                   <c:v>510.19</c:v>
@@ -2906,7 +2911,7 @@
                   <c:v>791.675</c:v>
                 </c:pt>
                 <c:pt idx="7">
-                  <c:v>783.5309999999998</c:v>
+                  <c:v>783.5309999999997</c:v>
                 </c:pt>
                 <c:pt idx="8">
                   <c:v>776.996</c:v>
@@ -3035,11 +3040,11 @@
         </c:dLbls>
         <c:marker val="1"/>
         <c:smooth val="0"/>
-        <c:axId val="2133930808"/>
-        <c:axId val="2133927816"/>
+        <c:axId val="2143214040"/>
+        <c:axId val="2143218856"/>
       </c:lineChart>
       <c:catAx>
-        <c:axId val="2133930808"/>
+        <c:axId val="2143214040"/>
         <c:scaling>
           <c:orientation val="minMax"/>
         </c:scaling>
@@ -3049,7 +3054,7 @@
         <c:majorTickMark val="out"/>
         <c:minorTickMark val="none"/>
         <c:tickLblPos val="nextTo"/>
-        <c:crossAx val="2133927816"/>
+        <c:crossAx val="2143218856"/>
         <c:crosses val="autoZero"/>
         <c:auto val="1"/>
         <c:lblAlgn val="ctr"/>
@@ -3057,7 +3062,7 @@
         <c:noMultiLvlLbl val="0"/>
       </c:catAx>
       <c:valAx>
-        <c:axId val="2133927816"/>
+        <c:axId val="2143218856"/>
         <c:scaling>
           <c:orientation val="minMax"/>
         </c:scaling>
@@ -3068,13 +3073,14 @@
         <c:majorTickMark val="out"/>
         <c:minorTickMark val="none"/>
         <c:tickLblPos val="nextTo"/>
-        <c:crossAx val="2133930808"/>
+        <c:crossAx val="2143214040"/>
         <c:crosses val="autoZero"/>
         <c:crossBetween val="between"/>
       </c:valAx>
     </c:plotArea>
     <c:legend>
       <c:legendPos val="r"/>
+      <c:layout/>
       <c:overlay val="0"/>
     </c:legend>
     <c:plotVisOnly val="1"/>
@@ -3121,6 +3127,7 @@
           </a:p>
         </c:rich>
       </c:tx>
+      <c:layout/>
       <c:overlay val="0"/>
     </c:title>
     <c:autoTitleDeleted val="0"/>
@@ -3219,10 +3226,10 @@
                   <c:v>534.0170000000001</c:v>
                 </c:pt>
                 <c:pt idx="8">
-                  <c:v>527.9269999999999</c:v>
+                  <c:v>527.9269999999998</c:v>
                 </c:pt>
                 <c:pt idx="9">
-                  <c:v>521.0509999999999</c:v>
+                  <c:v>521.0509999999998</c:v>
                 </c:pt>
                 <c:pt idx="10">
                   <c:v>510.19</c:v>
@@ -3345,11 +3352,11 @@
         </c:dLbls>
         <c:marker val="1"/>
         <c:smooth val="0"/>
-        <c:axId val="2137424136"/>
-        <c:axId val="2137421144"/>
+        <c:axId val="2108616728"/>
+        <c:axId val="2108620472"/>
       </c:lineChart>
       <c:catAx>
-        <c:axId val="2137424136"/>
+        <c:axId val="2108616728"/>
         <c:scaling>
           <c:orientation val="minMax"/>
         </c:scaling>
@@ -3359,7 +3366,7 @@
         <c:majorTickMark val="out"/>
         <c:minorTickMark val="none"/>
         <c:tickLblPos val="nextTo"/>
-        <c:crossAx val="2137421144"/>
+        <c:crossAx val="2108620472"/>
         <c:crosses val="autoZero"/>
         <c:auto val="1"/>
         <c:lblAlgn val="ctr"/>
@@ -3367,7 +3374,7 @@
         <c:noMultiLvlLbl val="0"/>
       </c:catAx>
       <c:valAx>
-        <c:axId val="2137421144"/>
+        <c:axId val="2108620472"/>
         <c:scaling>
           <c:orientation val="minMax"/>
         </c:scaling>
@@ -3378,13 +3385,14 @@
         <c:majorTickMark val="out"/>
         <c:minorTickMark val="none"/>
         <c:tickLblPos val="nextTo"/>
-        <c:crossAx val="2137424136"/>
+        <c:crossAx val="2108616728"/>
         <c:crosses val="autoZero"/>
         <c:crossBetween val="between"/>
       </c:valAx>
     </c:plotArea>
     <c:legend>
       <c:legendPos val="r"/>
+      <c:layout/>
       <c:overlay val="0"/>
     </c:legend>
     <c:plotVisOnly val="1"/>
@@ -3431,6 +3439,7 @@
           </a:p>
         </c:rich>
       </c:tx>
+      <c:layout/>
       <c:overlay val="0"/>
     </c:title>
     <c:autoTitleDeleted val="0"/>
@@ -3655,11 +3664,11 @@
         </c:dLbls>
         <c:marker val="1"/>
         <c:smooth val="0"/>
-        <c:axId val="2133898328"/>
-        <c:axId val="2133895336"/>
+        <c:axId val="2141107432"/>
+        <c:axId val="2140241496"/>
       </c:lineChart>
       <c:catAx>
-        <c:axId val="2133898328"/>
+        <c:axId val="2141107432"/>
         <c:scaling>
           <c:orientation val="minMax"/>
         </c:scaling>
@@ -3669,7 +3678,7 @@
         <c:majorTickMark val="out"/>
         <c:minorTickMark val="none"/>
         <c:tickLblPos val="nextTo"/>
-        <c:crossAx val="2133895336"/>
+        <c:crossAx val="2140241496"/>
         <c:crosses val="autoZero"/>
         <c:auto val="1"/>
         <c:lblAlgn val="ctr"/>
@@ -3677,7 +3686,7 @@
         <c:noMultiLvlLbl val="0"/>
       </c:catAx>
       <c:valAx>
-        <c:axId val="2133895336"/>
+        <c:axId val="2140241496"/>
         <c:scaling>
           <c:orientation val="minMax"/>
         </c:scaling>
@@ -3688,13 +3697,14 @@
         <c:majorTickMark val="out"/>
         <c:minorTickMark val="none"/>
         <c:tickLblPos val="nextTo"/>
-        <c:crossAx val="2133898328"/>
+        <c:crossAx val="2141107432"/>
         <c:crosses val="autoZero"/>
         <c:crossBetween val="between"/>
       </c:valAx>
     </c:plotArea>
     <c:legend>
       <c:legendPos val="r"/>
+      <c:layout/>
       <c:overlay val="0"/>
     </c:legend>
     <c:plotVisOnly val="1"/>
@@ -3889,11 +3899,11 @@
         </c:dLbls>
         <c:marker val="1"/>
         <c:smooth val="0"/>
-        <c:axId val="2134824152"/>
-        <c:axId val="2134826936"/>
+        <c:axId val="2111542632"/>
+        <c:axId val="2111545416"/>
       </c:lineChart>
       <c:catAx>
-        <c:axId val="2134824152"/>
+        <c:axId val="2111542632"/>
         <c:scaling>
           <c:orientation val="minMax"/>
         </c:scaling>
@@ -3903,7 +3913,7 @@
         <c:majorTickMark val="out"/>
         <c:minorTickMark val="none"/>
         <c:tickLblPos val="nextTo"/>
-        <c:crossAx val="2134826936"/>
+        <c:crossAx val="2111545416"/>
         <c:crosses val="autoZero"/>
         <c:auto val="1"/>
         <c:lblAlgn val="ctr"/>
@@ -3911,7 +3921,7 @@
         <c:noMultiLvlLbl val="0"/>
       </c:catAx>
       <c:valAx>
-        <c:axId val="2134826936"/>
+        <c:axId val="2111545416"/>
         <c:scaling>
           <c:logBase val="10.0"/>
           <c:orientation val="minMax"/>
@@ -3923,7 +3933,7 @@
         <c:majorTickMark val="out"/>
         <c:minorTickMark val="none"/>
         <c:tickLblPos val="nextTo"/>
-        <c:crossAx val="2134824152"/>
+        <c:crossAx val="2111542632"/>
         <c:crosses val="autoZero"/>
         <c:crossBetween val="between"/>
       </c:valAx>
@@ -4258,11 +4268,11 @@
         </c:dLbls>
         <c:marker val="1"/>
         <c:smooth val="0"/>
-        <c:axId val="2134876824"/>
-        <c:axId val="2134879848"/>
+        <c:axId val="2111595320"/>
+        <c:axId val="2111598344"/>
       </c:lineChart>
       <c:catAx>
-        <c:axId val="2134876824"/>
+        <c:axId val="2111595320"/>
         <c:scaling>
           <c:orientation val="minMax"/>
         </c:scaling>
@@ -4272,7 +4282,7 @@
         <c:majorTickMark val="out"/>
         <c:minorTickMark val="none"/>
         <c:tickLblPos val="nextTo"/>
-        <c:crossAx val="2134879848"/>
+        <c:crossAx val="2111598344"/>
         <c:crosses val="autoZero"/>
         <c:auto val="1"/>
         <c:lblAlgn val="ctr"/>
@@ -4280,7 +4290,7 @@
         <c:noMultiLvlLbl val="0"/>
       </c:catAx>
       <c:valAx>
-        <c:axId val="2134879848"/>
+        <c:axId val="2111598344"/>
         <c:scaling>
           <c:logBase val="10.0"/>
           <c:orientation val="minMax"/>
@@ -4292,7 +4302,7 @@
         <c:majorTickMark val="out"/>
         <c:minorTickMark val="none"/>
         <c:tickLblPos val="nextTo"/>
-        <c:crossAx val="2134876824"/>
+        <c:crossAx val="2111595320"/>
         <c:crosses val="autoZero"/>
         <c:crossBetween val="between"/>
       </c:valAx>
@@ -4704,7 +4714,7 @@
                   <c:v>245.404</c:v>
                 </c:pt>
                 <c:pt idx="2">
-                  <c:v>519.3659999999999</c:v>
+                  <c:v>519.3659999999998</c:v>
                 </c:pt>
                 <c:pt idx="3">
                   <c:v>1070.84</c:v>
@@ -4760,11 +4770,11 @@
         </c:dLbls>
         <c:marker val="1"/>
         <c:smooth val="0"/>
-        <c:axId val="2137543384"/>
-        <c:axId val="2137546408"/>
+        <c:axId val="2108805672"/>
+        <c:axId val="2108808680"/>
       </c:lineChart>
       <c:catAx>
-        <c:axId val="2137543384"/>
+        <c:axId val="2108805672"/>
         <c:scaling>
           <c:orientation val="minMax"/>
         </c:scaling>
@@ -4774,7 +4784,7 @@
         <c:majorTickMark val="out"/>
         <c:minorTickMark val="none"/>
         <c:tickLblPos val="nextTo"/>
-        <c:crossAx val="2137546408"/>
+        <c:crossAx val="2108808680"/>
         <c:crosses val="autoZero"/>
         <c:auto val="1"/>
         <c:lblAlgn val="ctr"/>
@@ -4782,7 +4792,7 @@
         <c:noMultiLvlLbl val="0"/>
       </c:catAx>
       <c:valAx>
-        <c:axId val="2137546408"/>
+        <c:axId val="2108808680"/>
         <c:scaling>
           <c:logBase val="10.0"/>
           <c:orientation val="minMax"/>
@@ -4794,7 +4804,7 @@
         <c:majorTickMark val="out"/>
         <c:minorTickMark val="none"/>
         <c:tickLblPos val="nextTo"/>
-        <c:crossAx val="2137543384"/>
+        <c:crossAx val="2108805672"/>
         <c:crosses val="autoZero"/>
         <c:crossBetween val="between"/>
       </c:valAx>
@@ -5206,7 +5216,7 @@
                   <c:v>245.404</c:v>
                 </c:pt>
                 <c:pt idx="2">
-                  <c:v>519.3659999999999</c:v>
+                  <c:v>519.3659999999998</c:v>
                 </c:pt>
                 <c:pt idx="3">
                   <c:v>1070.84</c:v>
@@ -5336,13 +5346,13 @@
                   <c:v>39.203</c:v>
                 </c:pt>
                 <c:pt idx="1">
-                  <c:v>92.17819999999999</c:v>
+                  <c:v>92.17819999999998</c:v>
                 </c:pt>
                 <c:pt idx="2">
                   <c:v>231.608</c:v>
                 </c:pt>
                 <c:pt idx="3">
-                  <c:v>585.0559999999999</c:v>
+                  <c:v>585.0559999999998</c:v>
                 </c:pt>
                 <c:pt idx="4">
                   <c:v>1373.79</c:v>
@@ -5395,11 +5405,11 @@
         </c:dLbls>
         <c:marker val="1"/>
         <c:smooth val="0"/>
-        <c:axId val="2137616408"/>
-        <c:axId val="2137619592"/>
+        <c:axId val="2108708536"/>
+        <c:axId val="2108705336"/>
       </c:lineChart>
       <c:catAx>
-        <c:axId val="2137616408"/>
+        <c:axId val="2108708536"/>
         <c:scaling>
           <c:orientation val="minMax"/>
         </c:scaling>
@@ -5409,7 +5419,7 @@
         <c:majorTickMark val="out"/>
         <c:minorTickMark val="none"/>
         <c:tickLblPos val="nextTo"/>
-        <c:crossAx val="2137619592"/>
+        <c:crossAx val="2108705336"/>
         <c:crosses val="autoZero"/>
         <c:auto val="1"/>
         <c:lblAlgn val="ctr"/>
@@ -5417,7 +5427,7 @@
         <c:noMultiLvlLbl val="0"/>
       </c:catAx>
       <c:valAx>
-        <c:axId val="2137619592"/>
+        <c:axId val="2108705336"/>
         <c:scaling>
           <c:logBase val="10.0"/>
           <c:orientation val="minMax"/>
@@ -5429,7 +5439,7 @@
         <c:majorTickMark val="out"/>
         <c:minorTickMark val="none"/>
         <c:tickLblPos val="nextTo"/>
-        <c:crossAx val="2137616408"/>
+        <c:crossAx val="2108708536"/>
         <c:crosses val="autoZero"/>
         <c:crossBetween val="between"/>
       </c:valAx>
@@ -5631,11 +5641,11 @@
         </c:dLbls>
         <c:marker val="1"/>
         <c:smooth val="0"/>
-        <c:axId val="2137679048"/>
-        <c:axId val="2137682008"/>
+        <c:axId val="2113095688"/>
+        <c:axId val="2113098648"/>
       </c:lineChart>
       <c:catAx>
-        <c:axId val="2137679048"/>
+        <c:axId val="2113095688"/>
         <c:scaling>
           <c:orientation val="minMax"/>
         </c:scaling>
@@ -5645,7 +5655,7 @@
         <c:majorTickMark val="out"/>
         <c:minorTickMark val="none"/>
         <c:tickLblPos val="nextTo"/>
-        <c:crossAx val="2137682008"/>
+        <c:crossAx val="2113098648"/>
         <c:crosses val="autoZero"/>
         <c:auto val="1"/>
         <c:lblAlgn val="ctr"/>
@@ -5653,7 +5663,7 @@
         <c:noMultiLvlLbl val="0"/>
       </c:catAx>
       <c:valAx>
-        <c:axId val="2137682008"/>
+        <c:axId val="2113098648"/>
         <c:scaling>
           <c:logBase val="10.0"/>
           <c:orientation val="minMax"/>
@@ -5665,7 +5675,7 @@
         <c:majorTickMark val="out"/>
         <c:minorTickMark val="none"/>
         <c:tickLblPos val="nextTo"/>
-        <c:crossAx val="2137679048"/>
+        <c:crossAx val="2113095688"/>
         <c:crosses val="autoZero"/>
         <c:crossBetween val="between"/>
       </c:valAx>
@@ -6000,11 +6010,11 @@
         </c:dLbls>
         <c:marker val="1"/>
         <c:smooth val="0"/>
-        <c:axId val="2134348376"/>
-        <c:axId val="2134340872"/>
+        <c:axId val="2113146600"/>
+        <c:axId val="2113149576"/>
       </c:lineChart>
       <c:catAx>
-        <c:axId val="2134348376"/>
+        <c:axId val="2113146600"/>
         <c:scaling>
           <c:orientation val="minMax"/>
         </c:scaling>
@@ -6014,7 +6024,7 @@
         <c:majorTickMark val="out"/>
         <c:minorTickMark val="none"/>
         <c:tickLblPos val="nextTo"/>
-        <c:crossAx val="2134340872"/>
+        <c:crossAx val="2113149576"/>
         <c:crosses val="autoZero"/>
         <c:auto val="1"/>
         <c:lblAlgn val="ctr"/>
@@ -6022,7 +6032,7 @@
         <c:noMultiLvlLbl val="0"/>
       </c:catAx>
       <c:valAx>
-        <c:axId val="2134340872"/>
+        <c:axId val="2113149576"/>
         <c:scaling>
           <c:logBase val="10.0"/>
           <c:orientation val="minMax"/>
@@ -6034,7 +6044,7 @@
         <c:majorTickMark val="out"/>
         <c:minorTickMark val="none"/>
         <c:tickLblPos val="nextTo"/>
-        <c:crossAx val="2134348376"/>
+        <c:crossAx val="2113146600"/>
         <c:crosses val="autoZero"/>
         <c:crossBetween val="between"/>
       </c:valAx>
@@ -6502,11 +6512,11 @@
         </c:dLbls>
         <c:marker val="1"/>
         <c:smooth val="0"/>
-        <c:axId val="2134277800"/>
-        <c:axId val="2134274808"/>
+        <c:axId val="2113200504"/>
+        <c:axId val="2113203480"/>
       </c:lineChart>
       <c:catAx>
-        <c:axId val="2134277800"/>
+        <c:axId val="2113200504"/>
         <c:scaling>
           <c:orientation val="minMax"/>
         </c:scaling>
@@ -6516,7 +6526,7 @@
         <c:majorTickMark val="out"/>
         <c:minorTickMark val="none"/>
         <c:tickLblPos val="nextTo"/>
-        <c:crossAx val="2134274808"/>
+        <c:crossAx val="2113203480"/>
         <c:crosses val="autoZero"/>
         <c:auto val="1"/>
         <c:lblAlgn val="ctr"/>
@@ -6524,7 +6534,7 @@
         <c:noMultiLvlLbl val="0"/>
       </c:catAx>
       <c:valAx>
-        <c:axId val="2134274808"/>
+        <c:axId val="2113203480"/>
         <c:scaling>
           <c:logBase val="10.0"/>
           <c:orientation val="minMax"/>
@@ -6536,7 +6546,7 @@
         <c:majorTickMark val="out"/>
         <c:minorTickMark val="none"/>
         <c:tickLblPos val="nextTo"/>
-        <c:crossAx val="2134277800"/>
+        <c:crossAx val="2113200504"/>
         <c:crosses val="autoZero"/>
         <c:crossBetween val="between"/>
       </c:valAx>
@@ -7004,11 +7014,11 @@
         </c:dLbls>
         <c:marker val="1"/>
         <c:smooth val="0"/>
-        <c:axId val="2134225480"/>
-        <c:axId val="2134222488"/>
+        <c:axId val="2113252824"/>
+        <c:axId val="2113255800"/>
       </c:lineChart>
       <c:catAx>
-        <c:axId val="2134225480"/>
+        <c:axId val="2113252824"/>
         <c:scaling>
           <c:orientation val="minMax"/>
         </c:scaling>
@@ -7018,7 +7028,7 @@
         <c:majorTickMark val="out"/>
         <c:minorTickMark val="none"/>
         <c:tickLblPos val="nextTo"/>
-        <c:crossAx val="2134222488"/>
+        <c:crossAx val="2113255800"/>
         <c:crosses val="autoZero"/>
         <c:auto val="1"/>
         <c:lblAlgn val="ctr"/>
@@ -7026,7 +7036,7 @@
         <c:noMultiLvlLbl val="0"/>
       </c:catAx>
       <c:valAx>
-        <c:axId val="2134222488"/>
+        <c:axId val="2113255800"/>
         <c:scaling>
           <c:orientation val="minMax"/>
         </c:scaling>
@@ -7037,7 +7047,7 @@
         <c:majorTickMark val="out"/>
         <c:minorTickMark val="none"/>
         <c:tickLblPos val="nextTo"/>
-        <c:crossAx val="2134225480"/>
+        <c:crossAx val="2113252824"/>
         <c:crosses val="autoZero"/>
         <c:crossBetween val="between"/>
       </c:valAx>
@@ -7139,7 +7149,7 @@
           <a:p>
             <a:fld id="{36E13BE1-15D0-144F-B11A-115503B958EA}" type="datetimeFigureOut">
               <a:rPr lang="en-US" smtClean="0"/>
-              <a:t>11/1/17</a:t>
+              <a:t>11/12/17</a:t>
             </a:fld>
             <a:endParaRPr lang="en-US"/>
           </a:p>
@@ -11372,7 +11382,7 @@
           <a:p>
             <a:fld id="{6BFECD78-3C8E-49F2-8FAB-59489D168ABB}" type="datetimeFigureOut">
               <a:rPr lang="en-US" smtClean="0"/>
-              <a:t>11/1/17</a:t>
+              <a:t>11/12/17</a:t>
             </a:fld>
             <a:endParaRPr lang="en-US"/>
           </a:p>
@@ -11542,7 +11552,7 @@
           <a:p>
             <a:fld id="{6BFECD78-3C8E-49F2-8FAB-59489D168ABB}" type="datetimeFigureOut">
               <a:rPr lang="en-US" smtClean="0"/>
-              <a:t>11/1/17</a:t>
+              <a:t>11/12/17</a:t>
             </a:fld>
             <a:endParaRPr lang="en-US"/>
           </a:p>
@@ -11722,7 +11732,7 @@
           <a:p>
             <a:fld id="{6BFECD78-3C8E-49F2-8FAB-59489D168ABB}" type="datetimeFigureOut">
               <a:rPr lang="en-US" smtClean="0"/>
-              <a:t>11/1/17</a:t>
+              <a:t>11/12/17</a:t>
             </a:fld>
             <a:endParaRPr lang="en-US"/>
           </a:p>
@@ -11892,7 +11902,7 @@
           <a:p>
             <a:fld id="{6BFECD78-3C8E-49F2-8FAB-59489D168ABB}" type="datetimeFigureOut">
               <a:rPr lang="en-US" smtClean="0"/>
-              <a:t>11/1/17</a:t>
+              <a:t>11/12/17</a:t>
             </a:fld>
             <a:endParaRPr lang="en-US"/>
           </a:p>
@@ -12138,7 +12148,7 @@
           <a:p>
             <a:fld id="{6BFECD78-3C8E-49F2-8FAB-59489D168ABB}" type="datetimeFigureOut">
               <a:rPr lang="en-US" smtClean="0"/>
-              <a:t>11/1/17</a:t>
+              <a:t>11/12/17</a:t>
             </a:fld>
             <a:endParaRPr lang="en-US"/>
           </a:p>
@@ -12426,7 +12436,7 @@
           <a:p>
             <a:fld id="{6BFECD78-3C8E-49F2-8FAB-59489D168ABB}" type="datetimeFigureOut">
               <a:rPr lang="en-US" smtClean="0"/>
-              <a:t>11/1/17</a:t>
+              <a:t>11/12/17</a:t>
             </a:fld>
             <a:endParaRPr lang="en-US"/>
           </a:p>
@@ -12848,7 +12858,7 @@
           <a:p>
             <a:fld id="{6BFECD78-3C8E-49F2-8FAB-59489D168ABB}" type="datetimeFigureOut">
               <a:rPr lang="en-US" smtClean="0"/>
-              <a:t>11/1/17</a:t>
+              <a:t>11/12/17</a:t>
             </a:fld>
             <a:endParaRPr lang="en-US"/>
           </a:p>
@@ -12966,7 +12976,7 @@
           <a:p>
             <a:fld id="{6BFECD78-3C8E-49F2-8FAB-59489D168ABB}" type="datetimeFigureOut">
               <a:rPr lang="en-US" smtClean="0"/>
-              <a:t>11/1/17</a:t>
+              <a:t>11/12/17</a:t>
             </a:fld>
             <a:endParaRPr lang="en-US"/>
           </a:p>
@@ -13061,7 +13071,7 @@
           <a:p>
             <a:fld id="{6BFECD78-3C8E-49F2-8FAB-59489D168ABB}" type="datetimeFigureOut">
               <a:rPr lang="en-US" smtClean="0"/>
-              <a:t>11/1/17</a:t>
+              <a:t>11/12/17</a:t>
             </a:fld>
             <a:endParaRPr lang="en-US"/>
           </a:p>
@@ -13338,7 +13348,7 @@
           <a:p>
             <a:fld id="{6BFECD78-3C8E-49F2-8FAB-59489D168ABB}" type="datetimeFigureOut">
               <a:rPr lang="en-US" smtClean="0"/>
-              <a:t>11/1/17</a:t>
+              <a:t>11/12/17</a:t>
             </a:fld>
             <a:endParaRPr lang="en-US"/>
           </a:p>
@@ -13595,7 +13605,7 @@
           <a:p>
             <a:fld id="{6BFECD78-3C8E-49F2-8FAB-59489D168ABB}" type="datetimeFigureOut">
               <a:rPr lang="en-US" smtClean="0"/>
-              <a:t>11/1/17</a:t>
+              <a:t>11/12/17</a:t>
             </a:fld>
             <a:endParaRPr lang="en-US"/>
           </a:p>
@@ -13808,7 +13818,7 @@
           <a:p>
             <a:fld id="{6BFECD78-3C8E-49F2-8FAB-59489D168ABB}" type="datetimeFigureOut">
               <a:rPr lang="en-US" smtClean="0"/>
-              <a:t>11/1/17</a:t>
+              <a:t>11/12/17</a:t>
             </a:fld>
             <a:endParaRPr lang="en-US"/>
           </a:p>
@@ -14813,7 +14823,15 @@
             </a:r>
             <a:r>
               <a:rPr lang="en-US" dirty="0" smtClean="0"/>
-              <a:t>complexity O(1) is excellent</a:t>
+              <a:t>complexity O</a:t>
+            </a:r>
+            <a:r>
+              <a:rPr lang="en-US" dirty="0" smtClean="0"/>
+              <a:t>(n) </a:t>
+            </a:r>
+            <a:r>
+              <a:rPr lang="en-US" dirty="0" smtClean="0"/>
+              <a:t>is excellent</a:t>
             </a:r>
             <a:endParaRPr lang="en-US" dirty="0"/>
           </a:p>
@@ -15326,7 +15344,15 @@
             </a:r>
             <a:r>
               <a:rPr lang="en-US" dirty="0" smtClean="0"/>
-              <a:t>complexity O(1) is excellent</a:t>
+              <a:t>complexity O</a:t>
+            </a:r>
+            <a:r>
+              <a:rPr lang="en-US" dirty="0" smtClean="0"/>
+              <a:t>(n) </a:t>
+            </a:r>
+            <a:r>
+              <a:rPr lang="en-US" dirty="0" smtClean="0"/>
+              <a:t>is excellent</a:t>
             </a:r>
             <a:endParaRPr lang="en-US" dirty="0"/>
           </a:p>
@@ -16171,7 +16197,23 @@
                   <a:srgbClr val="800000"/>
                 </a:solidFill>
               </a:rPr>
-              <a:t>complexity O(1) is excellent</a:t>
+              <a:t>complexity O</a:t>
+            </a:r>
+            <a:r>
+              <a:rPr lang="en-US" strike="sngStrike" dirty="0" smtClean="0">
+                <a:solidFill>
+                  <a:srgbClr val="800000"/>
+                </a:solidFill>
+              </a:rPr>
+              <a:t>(n) </a:t>
+            </a:r>
+            <a:r>
+              <a:rPr lang="en-US" strike="sngStrike" dirty="0" smtClean="0">
+                <a:solidFill>
+                  <a:srgbClr val="800000"/>
+                </a:solidFill>
+              </a:rPr>
+              <a:t>is excellent</a:t>
             </a:r>
             <a:endParaRPr lang="en-US" strike="sngStrike" dirty="0">
               <a:solidFill>
@@ -19583,7 +19625,15 @@
             </a:r>
             <a:r>
               <a:rPr lang="en-US" dirty="0" smtClean="0"/>
-              <a:t>complexity O(1) is excellent</a:t>
+              <a:t>complexity O</a:t>
+            </a:r>
+            <a:r>
+              <a:rPr lang="en-US" dirty="0" smtClean="0"/>
+              <a:t>(n) </a:t>
+            </a:r>
+            <a:r>
+              <a:rPr lang="en-US" dirty="0" smtClean="0"/>
+              <a:t>is excellent</a:t>
             </a:r>
             <a:endParaRPr lang="en-US" dirty="0"/>
           </a:p>

</xml_diff>